<commit_message>
Bugfix: for pbmc3k dataset, monocle requires diff cluster_cells() algorithm to avoid error.
</commit_message>
<xml_diff>
--- a/M6_Monocle_Pseudotime/M5_Monocle_Timeseries.pptx
+++ b/M6_Monocle_Pseudotime/M5_Monocle_Timeseries.pptx
@@ -5,7 +5,7 @@
     <p:sldMasterId id="2147483656" r:id="rId1"/>
   </p:sldMasterIdLst>
   <p:notesMasterIdLst>
-    <p:notesMasterId r:id="rId15"/>
+    <p:notesMasterId r:id="rId16"/>
   </p:notesMasterIdLst>
   <p:sldIdLst>
     <p:sldId id="256" r:id="rId2"/>
@@ -21,6 +21,7 @@
     <p:sldId id="269" r:id="rId12"/>
     <p:sldId id="270" r:id="rId13"/>
     <p:sldId id="271" r:id="rId14"/>
+    <p:sldId id="276" r:id="rId15"/>
   </p:sldIdLst>
   <p:sldSz cx="12192000" cy="6858000"/>
   <p:notesSz cx="6858000" cy="9144000"/>
@@ -209,7 +210,7 @@
           <a:p>
             <a:fld id="{FF40CFF0-3E11-4AF6-9747-7919C58FBC48}" type="datetimeFigureOut">
               <a:rPr lang="en-US" smtClean="0"/>
-              <a:t>2/20/2024</a:t>
+              <a:t>2/21/2024</a:t>
             </a:fld>
             <a:endParaRPr lang="en-US"/>
           </a:p>
@@ -1047,7 +1048,7 @@
           <a:p>
             <a:fld id="{9F69634C-F75C-45F7-A87A-C5E2AF3ECA41}" type="datetimeFigureOut">
               <a:rPr lang="en-US" smtClean="0"/>
-              <a:t>2/20/2024</a:t>
+              <a:t>2/21/2024</a:t>
             </a:fld>
             <a:endParaRPr lang="en-US"/>
           </a:p>
@@ -1212,7 +1213,7 @@
           <a:p>
             <a:fld id="{9F69634C-F75C-45F7-A87A-C5E2AF3ECA41}" type="datetimeFigureOut">
               <a:rPr lang="en-US" smtClean="0"/>
-              <a:t>2/20/2024</a:t>
+              <a:t>2/21/2024</a:t>
             </a:fld>
             <a:endParaRPr lang="en-US"/>
           </a:p>
@@ -1382,7 +1383,7 @@
           <a:p>
             <a:fld id="{9F69634C-F75C-45F7-A87A-C5E2AF3ECA41}" type="datetimeFigureOut">
               <a:rPr lang="en-US" smtClean="0"/>
-              <a:t>2/20/2024</a:t>
+              <a:t>2/21/2024</a:t>
             </a:fld>
             <a:endParaRPr lang="en-US"/>
           </a:p>
@@ -4437,7 +4438,7 @@
           <a:p>
             <a:fld id="{9F69634C-F75C-45F7-A87A-C5E2AF3ECA41}" type="datetimeFigureOut">
               <a:rPr lang="en-US" smtClean="0"/>
-              <a:t>2/20/2024</a:t>
+              <a:t>2/21/2024</a:t>
             </a:fld>
             <a:endParaRPr lang="en-US"/>
           </a:p>
@@ -4702,7 +4703,7 @@
           <a:p>
             <a:fld id="{9F69634C-F75C-45F7-A87A-C5E2AF3ECA41}" type="datetimeFigureOut">
               <a:rPr lang="en-US" smtClean="0"/>
-              <a:t>2/20/2024</a:t>
+              <a:t>2/21/2024</a:t>
             </a:fld>
             <a:endParaRPr lang="en-US"/>
           </a:p>
@@ -4815,7 +4816,7 @@
           <a:p>
             <a:fld id="{9F69634C-F75C-45F7-A87A-C5E2AF3ECA41}" type="datetimeFigureOut">
               <a:rPr lang="en-US" smtClean="0"/>
-              <a:t>2/20/2024</a:t>
+              <a:t>2/21/2024</a:t>
             </a:fld>
             <a:endParaRPr lang="en-US"/>
           </a:p>
@@ -5056,7 +5057,7 @@
           <a:p>
             <a:fld id="{9F69634C-F75C-45F7-A87A-C5E2AF3ECA41}" type="datetimeFigureOut">
               <a:rPr lang="en-US" smtClean="0"/>
-              <a:t>2/20/2024</a:t>
+              <a:t>2/21/2024</a:t>
             </a:fld>
             <a:endParaRPr lang="en-US"/>
           </a:p>
@@ -6823,8 +6824,8 @@
         </p:nvSpPr>
         <p:spPr>
           <a:xfrm>
-            <a:off x="1691034" y="3475128"/>
-            <a:ext cx="1604616" cy="3102998"/>
+            <a:off x="1691034" y="3429000"/>
+            <a:ext cx="1604616" cy="3149126"/>
           </a:xfrm>
           <a:prstGeom prst="rect">
             <a:avLst/>
@@ -7472,6 +7473,143 @@
     <p:extLst>
       <p:ext uri="{BB962C8B-B14F-4D97-AF65-F5344CB8AC3E}">
         <p14:creationId xmlns:p14="http://schemas.microsoft.com/office/powerpoint/2010/main" val="2009768086"/>
+      </p:ext>
+    </p:extLst>
+  </p:cSld>
+  <p:clrMapOvr>
+    <a:masterClrMapping/>
+  </p:clrMapOvr>
+</p:sld>
+</file>
+
+<file path=ppt/slides/slide14.xml><?xml version="1.0" encoding="utf-8"?>
+<p:sld xmlns:a="http://schemas.openxmlformats.org/drawingml/2006/main" xmlns:r="http://schemas.openxmlformats.org/officeDocument/2006/relationships" xmlns:p="http://schemas.openxmlformats.org/presentationml/2006/main">
+  <p:cSld>
+    <p:spTree>
+      <p:nvGrpSpPr>
+        <p:cNvPr id="1" name=""/>
+        <p:cNvGrpSpPr/>
+        <p:nvPr/>
+      </p:nvGrpSpPr>
+      <p:grpSpPr>
+        <a:xfrm>
+          <a:off x="0" y="0"/>
+          <a:ext cx="0" cy="0"/>
+          <a:chOff x="0" y="0"/>
+          <a:chExt cx="0" cy="0"/>
+        </a:xfrm>
+      </p:grpSpPr>
+      <p:sp>
+        <p:nvSpPr>
+          <p:cNvPr id="2" name="Title 1">
+            <a:extLst>
+              <a:ext uri="{FF2B5EF4-FFF2-40B4-BE49-F238E27FC236}">
+                <a16:creationId xmlns:a16="http://schemas.microsoft.com/office/drawing/2014/main" id="{361C74D4-BB8A-C9A5-8875-E490AFD846D3}"/>
+              </a:ext>
+            </a:extLst>
+          </p:cNvPr>
+          <p:cNvSpPr>
+            <a:spLocks noGrp="1"/>
+          </p:cNvSpPr>
+          <p:nvPr>
+            <p:ph type="title"/>
+          </p:nvPr>
+        </p:nvSpPr>
+        <p:spPr/>
+        <p:txBody>
+          <a:bodyPr/>
+          <a:lstStyle/>
+          <a:p>
+            <a:r>
+              <a:rPr lang="en-US" dirty="0"/>
+              <a:t>Monocle Troubleshooting</a:t>
+            </a:r>
+          </a:p>
+        </p:txBody>
+      </p:sp>
+      <p:sp>
+        <p:nvSpPr>
+          <p:cNvPr id="3" name="TextBox 2">
+            <a:extLst>
+              <a:ext uri="{FF2B5EF4-FFF2-40B4-BE49-F238E27FC236}">
+                <a16:creationId xmlns:a16="http://schemas.microsoft.com/office/drawing/2014/main" id="{0403626B-AFC7-59F3-1789-B060AB4080B8}"/>
+              </a:ext>
+            </a:extLst>
+          </p:cNvPr>
+          <p:cNvSpPr txBox="1"/>
+          <p:nvPr/>
+        </p:nvSpPr>
+        <p:spPr>
+          <a:xfrm>
+            <a:off x="237744" y="804672"/>
+            <a:ext cx="7298216" cy="1477328"/>
+          </a:xfrm>
+          <a:prstGeom prst="rect">
+            <a:avLst/>
+          </a:prstGeom>
+          <a:noFill/>
+        </p:spPr>
+        <p:txBody>
+          <a:bodyPr wrap="none" rtlCol="0">
+            <a:spAutoFit/>
+          </a:bodyPr>
+          <a:lstStyle/>
+          <a:p>
+            <a:r>
+              <a:rPr lang="en-US" dirty="0"/>
+              <a:t>Errors with Monocle3</a:t>
+            </a:r>
+          </a:p>
+          <a:p>
+            <a:pPr marL="342900" indent="-342900">
+              <a:buAutoNum type="arabicPeriod"/>
+            </a:pPr>
+            <a:r>
+              <a:rPr lang="en-US" dirty="0"/>
+              <a:t>Packages are not up-to-date</a:t>
+            </a:r>
+          </a:p>
+          <a:p>
+            <a:pPr marL="800100" lvl="1" indent="-342900">
+              <a:buAutoNum type="arabicPeriod"/>
+            </a:pPr>
+            <a:r>
+              <a:rPr lang="en-US" dirty="0"/>
+              <a:t>Install developer versions of Monocle3, </a:t>
+            </a:r>
+            <a:r>
+              <a:rPr lang="en-US" dirty="0" err="1"/>
+              <a:t>SeuratWrappers</a:t>
+            </a:r>
+            <a:r>
+              <a:rPr lang="en-US" dirty="0"/>
+              <a:t>, and Seurat</a:t>
+            </a:r>
+          </a:p>
+          <a:p>
+            <a:pPr marL="342900" indent="-342900">
+              <a:buAutoNum type="arabicPeriod"/>
+            </a:pPr>
+            <a:r>
+              <a:rPr lang="en-US" dirty="0"/>
+              <a:t>Internet search for error message, check for solutions.</a:t>
+            </a:r>
+          </a:p>
+          <a:p>
+            <a:pPr marL="342900" indent="-342900">
+              <a:buAutoNum type="arabicPeriod"/>
+            </a:pPr>
+            <a:r>
+              <a:rPr lang="en-US" dirty="0"/>
+              <a:t>Change parameters and algorithms for the step that raises error.</a:t>
+            </a:r>
+          </a:p>
+        </p:txBody>
+      </p:sp>
+    </p:spTree>
+    <p:extLst>
+      <p:ext uri="{BB962C8B-B14F-4D97-AF65-F5344CB8AC3E}">
+        <p14:creationId xmlns:p14="http://schemas.microsoft.com/office/powerpoint/2010/main" val="599323819"/>
       </p:ext>
     </p:extLst>
   </p:cSld>

</xml_diff>

<commit_message>
Updates to M3 and M5, not sure if these are out-of-date/ orphaned updates (may roll back progress, need to check).
</commit_message>
<xml_diff>
--- a/M6_Monocle_Pseudotime/M5_Monocle_Timeseries.pptx
+++ b/M6_Monocle_Pseudotime/M5_Monocle_Timeseries.pptx
@@ -212,7 +212,7 @@
           <a:p>
             <a:fld id="{FF40CFF0-3E11-4AF6-9747-7919C58FBC48}" type="datetimeFigureOut">
               <a:rPr lang="en-US" smtClean="0"/>
-              <a:t>2/27/2024</a:t>
+              <a:t>2/28/2024</a:t>
             </a:fld>
             <a:endParaRPr lang="en-US"/>
           </a:p>
@@ -1050,7 +1050,7 @@
           <a:p>
             <a:fld id="{9F69634C-F75C-45F7-A87A-C5E2AF3ECA41}" type="datetimeFigureOut">
               <a:rPr lang="en-US" smtClean="0"/>
-              <a:t>2/27/2024</a:t>
+              <a:t>2/28/2024</a:t>
             </a:fld>
             <a:endParaRPr lang="en-US"/>
           </a:p>
@@ -1215,7 +1215,7 @@
           <a:p>
             <a:fld id="{9F69634C-F75C-45F7-A87A-C5E2AF3ECA41}" type="datetimeFigureOut">
               <a:rPr lang="en-US" smtClean="0"/>
-              <a:t>2/27/2024</a:t>
+              <a:t>2/28/2024</a:t>
             </a:fld>
             <a:endParaRPr lang="en-US"/>
           </a:p>
@@ -1385,7 +1385,7 @@
           <a:p>
             <a:fld id="{9F69634C-F75C-45F7-A87A-C5E2AF3ECA41}" type="datetimeFigureOut">
               <a:rPr lang="en-US" smtClean="0"/>
-              <a:t>2/27/2024</a:t>
+              <a:t>2/28/2024</a:t>
             </a:fld>
             <a:endParaRPr lang="en-US"/>
           </a:p>
@@ -4440,7 +4440,7 @@
           <a:p>
             <a:fld id="{9F69634C-F75C-45F7-A87A-C5E2AF3ECA41}" type="datetimeFigureOut">
               <a:rPr lang="en-US" smtClean="0"/>
-              <a:t>2/27/2024</a:t>
+              <a:t>2/28/2024</a:t>
             </a:fld>
             <a:endParaRPr lang="en-US"/>
           </a:p>
@@ -4705,7 +4705,7 @@
           <a:p>
             <a:fld id="{9F69634C-F75C-45F7-A87A-C5E2AF3ECA41}" type="datetimeFigureOut">
               <a:rPr lang="en-US" smtClean="0"/>
-              <a:t>2/27/2024</a:t>
+              <a:t>2/28/2024</a:t>
             </a:fld>
             <a:endParaRPr lang="en-US"/>
           </a:p>
@@ -4818,7 +4818,7 @@
           <a:p>
             <a:fld id="{9F69634C-F75C-45F7-A87A-C5E2AF3ECA41}" type="datetimeFigureOut">
               <a:rPr lang="en-US" smtClean="0"/>
-              <a:t>2/27/2024</a:t>
+              <a:t>2/28/2024</a:t>
             </a:fld>
             <a:endParaRPr lang="en-US"/>
           </a:p>
@@ -5059,7 +5059,7 @@
           <a:p>
             <a:fld id="{9F69634C-F75C-45F7-A87A-C5E2AF3ECA41}" type="datetimeFigureOut">
               <a:rPr lang="en-US" smtClean="0"/>
-              <a:t>2/27/2024</a:t>
+              <a:t>2/28/2024</a:t>
             </a:fld>
             <a:endParaRPr lang="en-US"/>
           </a:p>
@@ -15092,18 +15092,7 @@
           <p:nvPr/>
         </p:nvPicPr>
         <p:blipFill>
-          <a:blip r:embed="rId6">
-            <a:clrChange>
-              <a:clrFrom>
-                <a:srgbClr val="FFFFFF"/>
-              </a:clrFrom>
-              <a:clrTo>
-                <a:srgbClr val="FFFFFF">
-                  <a:alpha val="0"/>
-                </a:srgbClr>
-              </a:clrTo>
-            </a:clrChange>
-          </a:blip>
+          <a:blip r:embed="rId6"/>
           <a:stretch>
             <a:fillRect/>
           </a:stretch>

</xml_diff>

<commit_message>
Updates to slide content.
</commit_message>
<xml_diff>
--- a/M6_Monocle_Pseudotime/M5_Monocle_Timeseries.pptx
+++ b/M6_Monocle_Pseudotime/M5_Monocle_Timeseries.pptx
@@ -5,7 +5,7 @@
     <p:sldMasterId id="2147483656" r:id="rId1"/>
   </p:sldMasterIdLst>
   <p:notesMasterIdLst>
-    <p:notesMasterId r:id="rId18"/>
+    <p:notesMasterId r:id="rId19"/>
   </p:notesMasterIdLst>
   <p:sldIdLst>
     <p:sldId id="256" r:id="rId2"/>
@@ -24,6 +24,7 @@
     <p:sldId id="276" r:id="rId15"/>
     <p:sldId id="277" r:id="rId16"/>
     <p:sldId id="278" r:id="rId17"/>
+    <p:sldId id="279" r:id="rId18"/>
   </p:sldIdLst>
   <p:sldSz cx="12192000" cy="6858000"/>
   <p:notesSz cx="6858000" cy="9144000"/>
@@ -212,7 +213,7 @@
           <a:p>
             <a:fld id="{FF40CFF0-3E11-4AF6-9747-7919C58FBC48}" type="datetimeFigureOut">
               <a:rPr lang="en-US" smtClean="0"/>
-              <a:t>2/28/2024</a:t>
+              <a:t>4/1/2024</a:t>
             </a:fld>
             <a:endParaRPr lang="en-US"/>
           </a:p>
@@ -1050,7 +1051,7 @@
           <a:p>
             <a:fld id="{9F69634C-F75C-45F7-A87A-C5E2AF3ECA41}" type="datetimeFigureOut">
               <a:rPr lang="en-US" smtClean="0"/>
-              <a:t>2/28/2024</a:t>
+              <a:t>4/1/2024</a:t>
             </a:fld>
             <a:endParaRPr lang="en-US"/>
           </a:p>
@@ -1215,7 +1216,7 @@
           <a:p>
             <a:fld id="{9F69634C-F75C-45F7-A87A-C5E2AF3ECA41}" type="datetimeFigureOut">
               <a:rPr lang="en-US" smtClean="0"/>
-              <a:t>2/28/2024</a:t>
+              <a:t>4/1/2024</a:t>
             </a:fld>
             <a:endParaRPr lang="en-US"/>
           </a:p>
@@ -1385,7 +1386,7 @@
           <a:p>
             <a:fld id="{9F69634C-F75C-45F7-A87A-C5E2AF3ECA41}" type="datetimeFigureOut">
               <a:rPr lang="en-US" smtClean="0"/>
-              <a:t>2/28/2024</a:t>
+              <a:t>4/1/2024</a:t>
             </a:fld>
             <a:endParaRPr lang="en-US"/>
           </a:p>
@@ -4440,7 +4441,7 @@
           <a:p>
             <a:fld id="{9F69634C-F75C-45F7-A87A-C5E2AF3ECA41}" type="datetimeFigureOut">
               <a:rPr lang="en-US" smtClean="0"/>
-              <a:t>2/28/2024</a:t>
+              <a:t>4/1/2024</a:t>
             </a:fld>
             <a:endParaRPr lang="en-US"/>
           </a:p>
@@ -4705,7 +4706,7 @@
           <a:p>
             <a:fld id="{9F69634C-F75C-45F7-A87A-C5E2AF3ECA41}" type="datetimeFigureOut">
               <a:rPr lang="en-US" smtClean="0"/>
-              <a:t>2/28/2024</a:t>
+              <a:t>4/1/2024</a:t>
             </a:fld>
             <a:endParaRPr lang="en-US"/>
           </a:p>
@@ -4818,7 +4819,7 @@
           <a:p>
             <a:fld id="{9F69634C-F75C-45F7-A87A-C5E2AF3ECA41}" type="datetimeFigureOut">
               <a:rPr lang="en-US" smtClean="0"/>
-              <a:t>2/28/2024</a:t>
+              <a:t>4/1/2024</a:t>
             </a:fld>
             <a:endParaRPr lang="en-US"/>
           </a:p>
@@ -5059,7 +5060,7 @@
           <a:p>
             <a:fld id="{9F69634C-F75C-45F7-A87A-C5E2AF3ECA41}" type="datetimeFigureOut">
               <a:rPr lang="en-US" smtClean="0"/>
-              <a:t>2/28/2024</a:t>
+              <a:t>4/1/2024</a:t>
             </a:fld>
             <a:endParaRPr lang="en-US"/>
           </a:p>
@@ -6148,7 +6149,7 @@
         <p:spPr>
           <a:xfrm>
             <a:off x="91440" y="941832"/>
-            <a:ext cx="1599594" cy="4773168"/>
+            <a:ext cx="1599594" cy="4782312"/>
           </a:xfrm>
           <a:prstGeom prst="rect">
             <a:avLst/>
@@ -8461,6 +8462,240 @@
 </p:sld>
 </file>
 
+<file path=ppt/slides/slide17.xml><?xml version="1.0" encoding="utf-8"?>
+<p:sld xmlns:a="http://schemas.openxmlformats.org/drawingml/2006/main" xmlns:r="http://schemas.openxmlformats.org/officeDocument/2006/relationships" xmlns:p="http://schemas.openxmlformats.org/presentationml/2006/main">
+  <p:cSld>
+    <p:spTree>
+      <p:nvGrpSpPr>
+        <p:cNvPr id="1" name=""/>
+        <p:cNvGrpSpPr/>
+        <p:nvPr/>
+      </p:nvGrpSpPr>
+      <p:grpSpPr>
+        <a:xfrm>
+          <a:off x="0" y="0"/>
+          <a:ext cx="0" cy="0"/>
+          <a:chOff x="0" y="0"/>
+          <a:chExt cx="0" cy="0"/>
+        </a:xfrm>
+      </p:grpSpPr>
+      <p:sp>
+        <p:nvSpPr>
+          <p:cNvPr id="2" name="Title 1">
+            <a:extLst>
+              <a:ext uri="{FF2B5EF4-FFF2-40B4-BE49-F238E27FC236}">
+                <a16:creationId xmlns:a16="http://schemas.microsoft.com/office/drawing/2014/main" id="{AF75F2D2-8C5D-1162-038F-F3A45728EB27}"/>
+              </a:ext>
+            </a:extLst>
+          </p:cNvPr>
+          <p:cNvSpPr>
+            <a:spLocks noGrp="1"/>
+          </p:cNvSpPr>
+          <p:nvPr>
+            <p:ph type="title"/>
+          </p:nvPr>
+        </p:nvSpPr>
+        <p:spPr/>
+        <p:txBody>
+          <a:bodyPr/>
+          <a:lstStyle/>
+          <a:p>
+            <a:r>
+              <a:rPr lang="en-US" dirty="0"/>
+              <a:t>How do we know that trajectory is real?</a:t>
+            </a:r>
+          </a:p>
+        </p:txBody>
+      </p:sp>
+      <p:pic>
+        <p:nvPicPr>
+          <p:cNvPr id="4" name="Picture 3">
+            <a:extLst>
+              <a:ext uri="{FF2B5EF4-FFF2-40B4-BE49-F238E27FC236}">
+                <a16:creationId xmlns:a16="http://schemas.microsoft.com/office/drawing/2014/main" id="{85C15183-A6C1-A4B1-D09E-A9E118C57AFA}"/>
+              </a:ext>
+            </a:extLst>
+          </p:cNvPr>
+          <p:cNvPicPr>
+            <a:picLocks noChangeAspect="1"/>
+          </p:cNvPicPr>
+          <p:nvPr/>
+        </p:nvPicPr>
+        <p:blipFill rotWithShape="1">
+          <a:blip r:embed="rId2"/>
+          <a:srcRect b="41789"/>
+          <a:stretch/>
+        </p:blipFill>
+        <p:spPr>
+          <a:xfrm>
+            <a:off x="534618" y="1626056"/>
+            <a:ext cx="6105492" cy="568050"/>
+          </a:xfrm>
+          <a:prstGeom prst="rect">
+            <a:avLst/>
+          </a:prstGeom>
+        </p:spPr>
+      </p:pic>
+      <p:pic>
+        <p:nvPicPr>
+          <p:cNvPr id="6" name="Picture 5">
+            <a:extLst>
+              <a:ext uri="{FF2B5EF4-FFF2-40B4-BE49-F238E27FC236}">
+                <a16:creationId xmlns:a16="http://schemas.microsoft.com/office/drawing/2014/main" id="{3BB46C27-59FD-E177-39D0-1DE2ECBEA055}"/>
+              </a:ext>
+            </a:extLst>
+          </p:cNvPr>
+          <p:cNvPicPr>
+            <a:picLocks noChangeAspect="1"/>
+          </p:cNvPicPr>
+          <p:nvPr/>
+        </p:nvPicPr>
+        <p:blipFill>
+          <a:blip r:embed="rId3"/>
+          <a:stretch>
+            <a:fillRect/>
+          </a:stretch>
+        </p:blipFill>
+        <p:spPr>
+          <a:xfrm>
+            <a:off x="534618" y="2405357"/>
+            <a:ext cx="4309251" cy="578597"/>
+          </a:xfrm>
+          <a:prstGeom prst="rect">
+            <a:avLst/>
+          </a:prstGeom>
+        </p:spPr>
+      </p:pic>
+      <p:pic>
+        <p:nvPicPr>
+          <p:cNvPr id="1026" name="Picture 2">
+            <a:extLst>
+              <a:ext uri="{FF2B5EF4-FFF2-40B4-BE49-F238E27FC236}">
+                <a16:creationId xmlns:a16="http://schemas.microsoft.com/office/drawing/2014/main" id="{0E9EB1D6-9EF3-23ED-0B4F-D489469ABD0F}"/>
+              </a:ext>
+            </a:extLst>
+          </p:cNvPr>
+          <p:cNvPicPr>
+            <a:picLocks noChangeAspect="1" noChangeArrowheads="1"/>
+          </p:cNvPicPr>
+          <p:nvPr/>
+        </p:nvPicPr>
+        <p:blipFill>
+          <a:blip r:embed="rId4">
+            <a:extLst>
+              <a:ext uri="{28A0092B-C50C-407E-A947-70E740481C1C}">
+                <a14:useLocalDpi xmlns:a14="http://schemas.microsoft.com/office/drawing/2010/main" val="0"/>
+              </a:ext>
+            </a:extLst>
+          </a:blip>
+          <a:srcRect/>
+          <a:stretch>
+            <a:fillRect/>
+          </a:stretch>
+        </p:blipFill>
+        <p:spPr bwMode="auto">
+          <a:xfrm>
+            <a:off x="5150954" y="1910081"/>
+            <a:ext cx="6434494" cy="1599534"/>
+          </a:xfrm>
+          <a:prstGeom prst="rect">
+            <a:avLst/>
+          </a:prstGeom>
+          <a:noFill/>
+          <a:extLst>
+            <a:ext uri="{909E8E84-426E-40DD-AFC4-6F175D3DCCD1}">
+              <a14:hiddenFill xmlns:a14="http://schemas.microsoft.com/office/drawing/2010/main">
+                <a:solidFill>
+                  <a:srgbClr val="FFFFFF"/>
+                </a:solidFill>
+              </a14:hiddenFill>
+            </a:ext>
+          </a:extLst>
+        </p:spPr>
+      </p:pic>
+      <p:sp>
+        <p:nvSpPr>
+          <p:cNvPr id="7" name="TextBox 6">
+            <a:extLst>
+              <a:ext uri="{FF2B5EF4-FFF2-40B4-BE49-F238E27FC236}">
+                <a16:creationId xmlns:a16="http://schemas.microsoft.com/office/drawing/2014/main" id="{7AEE448B-EFDB-4ED0-1BA0-5A0E5BCA322F}"/>
+              </a:ext>
+            </a:extLst>
+          </p:cNvPr>
+          <p:cNvSpPr txBox="1"/>
+          <p:nvPr/>
+        </p:nvSpPr>
+        <p:spPr>
+          <a:xfrm>
+            <a:off x="256032" y="3874047"/>
+            <a:ext cx="4174541" cy="369332"/>
+          </a:xfrm>
+          <a:prstGeom prst="rect">
+            <a:avLst/>
+          </a:prstGeom>
+          <a:noFill/>
+        </p:spPr>
+        <p:txBody>
+          <a:bodyPr wrap="none" rtlCol="0">
+            <a:spAutoFit/>
+          </a:bodyPr>
+          <a:lstStyle/>
+          <a:p>
+            <a:r>
+              <a:rPr lang="en-US" b="1" dirty="0"/>
+              <a:t>2) Inspection and Experimental Validation</a:t>
+            </a:r>
+          </a:p>
+        </p:txBody>
+      </p:sp>
+      <p:sp>
+        <p:nvSpPr>
+          <p:cNvPr id="8" name="TextBox 7">
+            <a:extLst>
+              <a:ext uri="{FF2B5EF4-FFF2-40B4-BE49-F238E27FC236}">
+                <a16:creationId xmlns:a16="http://schemas.microsoft.com/office/drawing/2014/main" id="{762A79B4-ED66-C0C2-FD89-B6C3711AA7A0}"/>
+              </a:ext>
+            </a:extLst>
+          </p:cNvPr>
+          <p:cNvSpPr txBox="1"/>
+          <p:nvPr/>
+        </p:nvSpPr>
+        <p:spPr>
+          <a:xfrm>
+            <a:off x="256032" y="1039142"/>
+            <a:ext cx="5602046" cy="369332"/>
+          </a:xfrm>
+          <a:prstGeom prst="rect">
+            <a:avLst/>
+          </a:prstGeom>
+          <a:noFill/>
+        </p:spPr>
+        <p:txBody>
+          <a:bodyPr wrap="none" rtlCol="0">
+            <a:spAutoFit/>
+          </a:bodyPr>
+          <a:lstStyle/>
+          <a:p>
+            <a:r>
+              <a:rPr lang="en-US" b="1" dirty="0"/>
+              <a:t>1) Statistical Analysis (Ongoing research &amp; Development)</a:t>
+            </a:r>
+          </a:p>
+        </p:txBody>
+      </p:sp>
+    </p:spTree>
+    <p:extLst>
+      <p:ext uri="{BB962C8B-B14F-4D97-AF65-F5344CB8AC3E}">
+        <p14:creationId xmlns:p14="http://schemas.microsoft.com/office/powerpoint/2010/main" val="2068461900"/>
+      </p:ext>
+    </p:extLst>
+  </p:cSld>
+  <p:clrMapOvr>
+    <a:masterClrMapping/>
+  </p:clrMapOvr>
+</p:sld>
+</file>
+
 <file path=ppt/slides/slide2.xml><?xml version="1.0" encoding="utf-8"?>
 <p:sld xmlns:a="http://schemas.openxmlformats.org/drawingml/2006/main" xmlns:r="http://schemas.openxmlformats.org/officeDocument/2006/relationships" xmlns:p="http://schemas.openxmlformats.org/presentationml/2006/main">
   <p:cSld>
@@ -8528,7 +8763,7 @@
         </p:nvSpPr>
         <p:spPr>
           <a:xfrm>
-            <a:off x="898525" y="1166336"/>
+            <a:off x="274411" y="1198154"/>
             <a:ext cx="6191250" cy="1477328"/>
           </a:xfrm>
           <a:prstGeom prst="rect">
@@ -8587,7 +8822,7 @@
         </p:blipFill>
         <p:spPr>
           <a:xfrm>
-            <a:off x="1200150" y="2837993"/>
+            <a:off x="832617" y="3013325"/>
             <a:ext cx="8058150" cy="3729772"/>
           </a:xfrm>
           <a:prstGeom prst="rect">
@@ -8609,8 +8844,8 @@
         </p:nvSpPr>
         <p:spPr>
           <a:xfrm>
-            <a:off x="6822309" y="1720334"/>
-            <a:ext cx="7785336" cy="923330"/>
+            <a:off x="7330309" y="1059655"/>
+            <a:ext cx="4471166" cy="1754326"/>
           </a:xfrm>
           <a:prstGeom prst="rect">
             <a:avLst/>
@@ -8618,7 +8853,7 @@
           <a:noFill/>
         </p:spPr>
         <p:txBody>
-          <a:bodyPr wrap="none" rtlCol="0">
+          <a:bodyPr wrap="square" rtlCol="0">
             <a:spAutoFit/>
           </a:bodyPr>
           <a:lstStyle/>

</xml_diff>